<commit_message>
added new components diagram
</commit_message>
<xml_diff>
--- a/components.pptx
+++ b/components.pptx
@@ -136,7 +136,7 @@
         </p:nvSpPr>
         <p:spPr>
           <a:xfrm>
-            <a:off x="685800" y="2130425"/>
+            <a:off x="685800" y="2130426"/>
             <a:ext cx="7772400" cy="1470025"/>
           </a:xfrm>
         </p:spPr>
@@ -288,7 +288,7 @@
           <a:p>
             <a:fld id="{228260F5-9DAE-4DEB-ADD0-AD3FF37E2635}" type="datetimeFigureOut">
               <a:rPr lang="en-US" smtClean="0"/>
-              <a:t>3/19/2012</a:t>
+              <a:t>8/29/2012</a:t>
             </a:fld>
             <a:endParaRPr lang="en-US"/>
           </a:p>
@@ -458,7 +458,7 @@
           <a:p>
             <a:fld id="{228260F5-9DAE-4DEB-ADD0-AD3FF37E2635}" type="datetimeFigureOut">
               <a:rPr lang="en-US" smtClean="0"/>
-              <a:t>3/19/2012</a:t>
+              <a:t>8/29/2012</a:t>
             </a:fld>
             <a:endParaRPr lang="en-US"/>
           </a:p>
@@ -548,7 +548,7 @@
         </p:nvSpPr>
         <p:spPr>
           <a:xfrm>
-            <a:off x="6629400" y="274638"/>
+            <a:off x="6629400" y="274639"/>
             <a:ext cx="2057400" cy="5851525"/>
           </a:xfrm>
         </p:spPr>
@@ -576,7 +576,7 @@
         </p:nvSpPr>
         <p:spPr>
           <a:xfrm>
-            <a:off x="457200" y="274638"/>
+            <a:off x="457200" y="274639"/>
             <a:ext cx="6019800" cy="5851525"/>
           </a:xfrm>
         </p:spPr>
@@ -638,7 +638,7 @@
           <a:p>
             <a:fld id="{228260F5-9DAE-4DEB-ADD0-AD3FF37E2635}" type="datetimeFigureOut">
               <a:rPr lang="en-US" smtClean="0"/>
-              <a:t>3/19/2012</a:t>
+              <a:t>8/29/2012</a:t>
             </a:fld>
             <a:endParaRPr lang="en-US"/>
           </a:p>
@@ -808,7 +808,7 @@
           <a:p>
             <a:fld id="{228260F5-9DAE-4DEB-ADD0-AD3FF37E2635}" type="datetimeFigureOut">
               <a:rPr lang="en-US" smtClean="0"/>
-              <a:t>3/19/2012</a:t>
+              <a:t>8/29/2012</a:t>
             </a:fld>
             <a:endParaRPr lang="en-US"/>
           </a:p>
@@ -898,7 +898,7 @@
         </p:nvSpPr>
         <p:spPr>
           <a:xfrm>
-            <a:off x="722313" y="4406900"/>
+            <a:off x="722313" y="4406901"/>
             <a:ext cx="7772400" cy="1362075"/>
           </a:xfrm>
         </p:spPr>
@@ -1054,7 +1054,7 @@
           <a:p>
             <a:fld id="{228260F5-9DAE-4DEB-ADD0-AD3FF37E2635}" type="datetimeFigureOut">
               <a:rPr lang="en-US" smtClean="0"/>
-              <a:t>3/19/2012</a:t>
+              <a:t>8/29/2012</a:t>
             </a:fld>
             <a:endParaRPr lang="en-US"/>
           </a:p>
@@ -1167,7 +1167,7 @@
         </p:nvSpPr>
         <p:spPr>
           <a:xfrm>
-            <a:off x="457200" y="1600200"/>
+            <a:off x="457200" y="1600201"/>
             <a:ext cx="4038600" cy="4525963"/>
           </a:xfrm>
         </p:spPr>
@@ -1252,7 +1252,7 @@
         </p:nvSpPr>
         <p:spPr>
           <a:xfrm>
-            <a:off x="4648200" y="1600200"/>
+            <a:off x="4648200" y="1600201"/>
             <a:ext cx="4038600" cy="4525963"/>
           </a:xfrm>
         </p:spPr>
@@ -1342,7 +1342,7 @@
           <a:p>
             <a:fld id="{228260F5-9DAE-4DEB-ADD0-AD3FF37E2635}" type="datetimeFigureOut">
               <a:rPr lang="en-US" smtClean="0"/>
-              <a:t>3/19/2012</a:t>
+              <a:t>8/29/2012</a:t>
             </a:fld>
             <a:endParaRPr lang="en-US"/>
           </a:p>
@@ -1609,7 +1609,7 @@
         </p:nvSpPr>
         <p:spPr>
           <a:xfrm>
-            <a:off x="4645025" y="1535113"/>
+            <a:off x="4645026" y="1535113"/>
             <a:ext cx="4041775" cy="639762"/>
           </a:xfrm>
         </p:spPr>
@@ -1674,7 +1674,7 @@
         </p:nvSpPr>
         <p:spPr>
           <a:xfrm>
-            <a:off x="4645025" y="2174875"/>
+            <a:off x="4645026" y="2174875"/>
             <a:ext cx="4041775" cy="3951288"/>
           </a:xfrm>
         </p:spPr>
@@ -1764,7 +1764,7 @@
           <a:p>
             <a:fld id="{228260F5-9DAE-4DEB-ADD0-AD3FF37E2635}" type="datetimeFigureOut">
               <a:rPr lang="en-US" smtClean="0"/>
-              <a:t>3/19/2012</a:t>
+              <a:t>8/29/2012</a:t>
             </a:fld>
             <a:endParaRPr lang="en-US"/>
           </a:p>
@@ -1882,7 +1882,7 @@
           <a:p>
             <a:fld id="{228260F5-9DAE-4DEB-ADD0-AD3FF37E2635}" type="datetimeFigureOut">
               <a:rPr lang="en-US" smtClean="0"/>
-              <a:t>3/19/2012</a:t>
+              <a:t>8/29/2012</a:t>
             </a:fld>
             <a:endParaRPr lang="en-US"/>
           </a:p>
@@ -1977,7 +1977,7 @@
           <a:p>
             <a:fld id="{228260F5-9DAE-4DEB-ADD0-AD3FF37E2635}" type="datetimeFigureOut">
               <a:rPr lang="en-US" smtClean="0"/>
-              <a:t>3/19/2012</a:t>
+              <a:t>8/29/2012</a:t>
             </a:fld>
             <a:endParaRPr lang="en-US"/>
           </a:p>
@@ -2067,7 +2067,7 @@
         </p:nvSpPr>
         <p:spPr>
           <a:xfrm>
-            <a:off x="457200" y="273050"/>
+            <a:off x="457201" y="273050"/>
             <a:ext cx="3008313" cy="1162050"/>
           </a:xfrm>
         </p:spPr>
@@ -2099,7 +2099,7 @@
         </p:nvSpPr>
         <p:spPr>
           <a:xfrm>
-            <a:off x="3575050" y="273050"/>
+            <a:off x="3575050" y="273051"/>
             <a:ext cx="5111750" cy="5853113"/>
           </a:xfrm>
         </p:spPr>
@@ -2184,7 +2184,7 @@
         </p:nvSpPr>
         <p:spPr>
           <a:xfrm>
-            <a:off x="457200" y="1435100"/>
+            <a:off x="457201" y="1435101"/>
             <a:ext cx="3008313" cy="4691063"/>
           </a:xfrm>
         </p:spPr>
@@ -2254,7 +2254,7 @@
           <a:p>
             <a:fld id="{228260F5-9DAE-4DEB-ADD0-AD3FF37E2635}" type="datetimeFigureOut">
               <a:rPr lang="en-US" smtClean="0"/>
-              <a:t>3/19/2012</a:t>
+              <a:t>8/29/2012</a:t>
             </a:fld>
             <a:endParaRPr lang="en-US"/>
           </a:p>
@@ -2507,7 +2507,7 @@
           <a:p>
             <a:fld id="{228260F5-9DAE-4DEB-ADD0-AD3FF37E2635}" type="datetimeFigureOut">
               <a:rPr lang="en-US" smtClean="0"/>
-              <a:t>3/19/2012</a:t>
+              <a:t>8/29/2012</a:t>
             </a:fld>
             <a:endParaRPr lang="en-US"/>
           </a:p>
@@ -2635,7 +2635,7 @@
         </p:nvSpPr>
         <p:spPr>
           <a:xfrm>
-            <a:off x="457200" y="1600200"/>
+            <a:off x="457200" y="1600201"/>
             <a:ext cx="8229600" cy="4525963"/>
           </a:xfrm>
           <a:prstGeom prst="rect">
@@ -2697,7 +2697,7 @@
         </p:nvSpPr>
         <p:spPr>
           <a:xfrm>
-            <a:off x="457200" y="6356350"/>
+            <a:off x="457200" y="6356351"/>
             <a:ext cx="2133600" cy="365125"/>
           </a:xfrm>
           <a:prstGeom prst="rect">
@@ -2720,7 +2720,7 @@
           <a:p>
             <a:fld id="{228260F5-9DAE-4DEB-ADD0-AD3FF37E2635}" type="datetimeFigureOut">
               <a:rPr lang="en-US" smtClean="0"/>
-              <a:t>3/19/2012</a:t>
+              <a:t>8/29/2012</a:t>
             </a:fld>
             <a:endParaRPr lang="en-US"/>
           </a:p>
@@ -2738,7 +2738,7 @@
         </p:nvSpPr>
         <p:spPr>
           <a:xfrm>
-            <a:off x="3124200" y="6356350"/>
+            <a:off x="3124200" y="6356351"/>
             <a:ext cx="2895600" cy="365125"/>
           </a:xfrm>
           <a:prstGeom prst="rect">
@@ -2775,7 +2775,7 @@
         </p:nvSpPr>
         <p:spPr>
           <a:xfrm>
-            <a:off x="6553200" y="6356350"/>
+            <a:off x="6553200" y="6356351"/>
             <a:ext cx="2133600" cy="365125"/>
           </a:xfrm>
           <a:prstGeom prst="rect">
@@ -3097,18 +3097,49 @@
       </p:grpSpPr>
       <p:sp>
         <p:nvSpPr>
-          <p:cNvPr id="18" name="Rounded Rectangle 17"/>
+          <p:cNvPr id="58" name="TextBox 57"/>
+          <p:cNvSpPr txBox="1"/>
+          <p:nvPr/>
+        </p:nvSpPr>
+        <p:spPr>
+          <a:xfrm>
+            <a:off x="1259032" y="1170801"/>
+            <a:ext cx="935184" cy="276999"/>
+          </a:xfrm>
+          <a:prstGeom prst="rect">
+            <a:avLst/>
+          </a:prstGeom>
+          <a:noFill/>
+        </p:spPr>
+        <p:txBody>
+          <a:bodyPr wrap="square" lIns="91440" tIns="45720" rIns="91440" bIns="45720" rtlCol="0">
+            <a:spAutoFit/>
+          </a:bodyPr>
+          <a:lstStyle/>
+          <a:p>
+            <a:r>
+              <a:rPr lang="en-US" sz="1200" dirty="0" smtClean="0"/>
+              <a:t>generates</a:t>
+            </a:r>
+            <a:endParaRPr lang="en-US" sz="1200" dirty="0"/>
+          </a:p>
+        </p:txBody>
+      </p:sp>
+      <p:sp>
+        <p:nvSpPr>
+          <p:cNvPr id="27" name="Rounded Rectangle 26"/>
           <p:cNvSpPr/>
           <p:nvPr/>
         </p:nvSpPr>
         <p:spPr>
           <a:xfrm>
-            <a:off x="2667000" y="1905000"/>
+            <a:off x="192232" y="1524000"/>
             <a:ext cx="2209800" cy="609600"/>
           </a:xfrm>
           <a:prstGeom prst="roundRect">
             <a:avLst/>
           </a:prstGeom>
+          <a:ln cmpd="sng"/>
         </p:spPr>
         <p:style>
           <a:lnRef idx="2">
@@ -3127,13 +3158,17 @@
           </a:fontRef>
         </p:style>
         <p:txBody>
-          <a:bodyPr rtlCol="0" anchor="ctr"/>
+          <a:bodyPr lIns="91440" tIns="45720" rIns="91440" bIns="45720" rtlCol="0" anchor="ctr"/>
           <a:lstStyle/>
           <a:p>
             <a:pPr algn="ctr"/>
             <a:r>
               <a:rPr lang="en-US" dirty="0" err="1" smtClean="0"/>
-              <a:t>api</a:t>
+              <a:t>visko</a:t>
+            </a:r>
+            <a:r>
+              <a:rPr lang="en-US" dirty="0" smtClean="0"/>
+              <a:t>-packages</a:t>
             </a:r>
             <a:endParaRPr lang="en-US" dirty="0"/>
           </a:p>
@@ -3141,13 +3176,13 @@
       </p:sp>
       <p:sp>
         <p:nvSpPr>
-          <p:cNvPr id="19" name="Rounded Rectangle 18"/>
+          <p:cNvPr id="28" name="Rounded Rectangle 27"/>
           <p:cNvSpPr/>
           <p:nvPr/>
         </p:nvSpPr>
         <p:spPr>
           <a:xfrm>
-            <a:off x="2667000" y="493931"/>
+            <a:off x="192232" y="304800"/>
             <a:ext cx="2209800" cy="609600"/>
           </a:xfrm>
           <a:prstGeom prst="roundRect">
@@ -3171,7 +3206,7 @@
           </a:fontRef>
         </p:style>
         <p:txBody>
-          <a:bodyPr rtlCol="0" anchor="ctr"/>
+          <a:bodyPr lIns="91440" tIns="45720" rIns="91440" bIns="45720" rtlCol="0" anchor="ctr"/>
           <a:lstStyle/>
           <a:p>
             <a:pPr algn="ctr"/>
@@ -3181,26 +3216,132 @@
             </a:r>
             <a:r>
               <a:rPr lang="en-US" dirty="0" smtClean="0"/>
-              <a:t>-web</a:t>
+              <a:t>-packages-</a:t>
+            </a:r>
+            <a:r>
+              <a:rPr lang="en-US" dirty="0" err="1" smtClean="0"/>
+              <a:t>rdf</a:t>
             </a:r>
             <a:endParaRPr lang="en-US" dirty="0"/>
           </a:p>
         </p:txBody>
       </p:sp>
-      <p:sp>
-        <p:nvSpPr>
-          <p:cNvPr id="20" name="Rounded Rectangle 19"/>
+      <p:grpSp>
+        <p:nvGrpSpPr>
+          <p:cNvPr id="36" name="Group 35"/>
+          <p:cNvGrpSpPr/>
+          <p:nvPr/>
+        </p:nvGrpSpPr>
+        <p:grpSpPr>
+          <a:xfrm>
+            <a:off x="3392632" y="76200"/>
+            <a:ext cx="5522768" cy="2209800"/>
+            <a:chOff x="-12056045" y="7827940"/>
+            <a:chExt cx="11045535" cy="4419600"/>
+          </a:xfrm>
+        </p:grpSpPr>
+        <p:sp>
+          <p:nvSpPr>
+            <p:cNvPr id="29" name="Rounded Rectangle 28"/>
+            <p:cNvSpPr/>
+            <p:nvPr/>
+          </p:nvSpPr>
+          <p:spPr>
+            <a:xfrm>
+              <a:off x="-12056045" y="7827940"/>
+              <a:ext cx="11045535" cy="4419600"/>
+            </a:xfrm>
+            <a:prstGeom prst="roundRect">
+              <a:avLst>
+                <a:gd name="adj" fmla="val 8805"/>
+              </a:avLst>
+            </a:prstGeom>
+            <a:ln cmpd="sng"/>
+          </p:spPr>
+          <p:style>
+            <a:lnRef idx="2">
+              <a:schemeClr val="accent1">
+                <a:shade val="50000"/>
+              </a:schemeClr>
+            </a:lnRef>
+            <a:fillRef idx="1">
+              <a:schemeClr val="accent1"/>
+            </a:fillRef>
+            <a:effectRef idx="0">
+              <a:schemeClr val="accent1"/>
+            </a:effectRef>
+            <a:fontRef idx="minor">
+              <a:schemeClr val="lt1"/>
+            </a:fontRef>
+          </p:style>
+          <p:txBody>
+            <a:bodyPr lIns="182880" tIns="91440" rIns="182880" bIns="91440" rtlCol="0" anchor="ctr"/>
+            <a:lstStyle/>
+            <a:p>
+              <a:pPr algn="ctr"/>
+              <a:endParaRPr lang="en-US" dirty="0"/>
+            </a:p>
+          </p:txBody>
+        </p:sp>
+        <p:sp>
+          <p:nvSpPr>
+            <p:cNvPr id="9" name="TextBox 8"/>
+            <p:cNvSpPr txBox="1"/>
+            <p:nvPr/>
+          </p:nvSpPr>
+          <p:spPr>
+            <a:xfrm>
+              <a:off x="-7175781" y="7851276"/>
+              <a:ext cx="1745672" cy="738664"/>
+            </a:xfrm>
+            <a:prstGeom prst="rect">
+              <a:avLst/>
+            </a:prstGeom>
+            <a:noFill/>
+          </p:spPr>
+          <p:txBody>
+            <a:bodyPr wrap="square" rtlCol="0">
+              <a:spAutoFit/>
+            </a:bodyPr>
+            <a:lstStyle/>
+            <a:p>
+              <a:r>
+                <a:rPr lang="en-US" dirty="0" err="1" smtClean="0">
+                  <a:solidFill>
+                    <a:schemeClr val="bg1"/>
+                  </a:solidFill>
+                </a:rPr>
+                <a:t>visko</a:t>
+              </a:r>
+              <a:endParaRPr lang="en-US" dirty="0">
+                <a:solidFill>
+                  <a:schemeClr val="bg1"/>
+                </a:solidFill>
+              </a:endParaRPr>
+            </a:p>
+          </p:txBody>
+        </p:sp>
+      </p:grpSp>
+      <p:sp>
+        <p:nvSpPr>
+          <p:cNvPr id="18" name="Rounded Rectangle 17"/>
           <p:cNvSpPr/>
           <p:nvPr/>
         </p:nvSpPr>
         <p:spPr>
           <a:xfrm>
-            <a:off x="1123950" y="3352800"/>
-            <a:ext cx="2228850" cy="609600"/>
+            <a:off x="6593032" y="304800"/>
+            <a:ext cx="2209800" cy="609600"/>
           </a:xfrm>
           <a:prstGeom prst="roundRect">
             <a:avLst/>
           </a:prstGeom>
+          <a:solidFill>
+            <a:schemeClr val="accent1">
+              <a:lumMod val="60000"/>
+              <a:lumOff val="40000"/>
+            </a:schemeClr>
+          </a:solidFill>
         </p:spPr>
         <p:style>
           <a:lnRef idx="2">
@@ -3219,13 +3360,13 @@
           </a:fontRef>
         </p:style>
         <p:txBody>
-          <a:bodyPr rtlCol="0" anchor="ctr"/>
+          <a:bodyPr lIns="91440" tIns="45720" rIns="91440" bIns="45720" rtlCol="0" anchor="ctr"/>
           <a:lstStyle/>
           <a:p>
             <a:pPr algn="ctr"/>
             <a:r>
               <a:rPr lang="en-US" dirty="0" err="1" smtClean="0"/>
-              <a:t>rdf</a:t>
+              <a:t>api</a:t>
             </a:r>
             <a:endParaRPr lang="en-US" dirty="0"/>
           </a:p>
@@ -3233,14 +3374,110 @@
       </p:sp>
       <p:sp>
         <p:nvSpPr>
-          <p:cNvPr id="24" name="TextBox 23"/>
+          <p:cNvPr id="19" name="Rounded Rectangle 18"/>
+          <p:cNvSpPr/>
+          <p:nvPr/>
+        </p:nvSpPr>
+        <p:spPr>
+          <a:xfrm>
+            <a:off x="6593032" y="1447800"/>
+            <a:ext cx="2209800" cy="609600"/>
+          </a:xfrm>
+          <a:prstGeom prst="roundRect">
+            <a:avLst/>
+          </a:prstGeom>
+          <a:solidFill>
+            <a:schemeClr val="accent1">
+              <a:lumMod val="60000"/>
+              <a:lumOff val="40000"/>
+            </a:schemeClr>
+          </a:solidFill>
+        </p:spPr>
+        <p:style>
+          <a:lnRef idx="2">
+            <a:schemeClr val="accent1">
+              <a:shade val="50000"/>
+            </a:schemeClr>
+          </a:lnRef>
+          <a:fillRef idx="1">
+            <a:schemeClr val="accent1"/>
+          </a:fillRef>
+          <a:effectRef idx="0">
+            <a:schemeClr val="accent1"/>
+          </a:effectRef>
+          <a:fontRef idx="minor">
+            <a:schemeClr val="lt1"/>
+          </a:fontRef>
+        </p:style>
+        <p:txBody>
+          <a:bodyPr lIns="91440" tIns="45720" rIns="91440" bIns="45720" rtlCol="0" anchor="ctr"/>
+          <a:lstStyle/>
+          <a:p>
+            <a:pPr algn="ctr"/>
+            <a:r>
+              <a:rPr lang="en-US" dirty="0" err="1" smtClean="0"/>
+              <a:t>visko</a:t>
+            </a:r>
+            <a:r>
+              <a:rPr lang="en-US" dirty="0" smtClean="0"/>
+              <a:t>-web</a:t>
+            </a:r>
+            <a:endParaRPr lang="en-US" dirty="0"/>
+          </a:p>
+        </p:txBody>
+      </p:sp>
+      <p:cxnSp>
+        <p:nvCxnSpPr>
+          <p:cNvPr id="31" name="Straight Arrow Connector 30"/>
+          <p:cNvCxnSpPr>
+            <a:stCxn id="27" idx="0"/>
+            <a:endCxn id="28" idx="2"/>
+          </p:cNvCxnSpPr>
+          <p:nvPr/>
+        </p:nvCxnSpPr>
+        <p:spPr>
+          <a:xfrm flipV="1">
+            <a:off x="1297132" y="914400"/>
+            <a:ext cx="0" cy="609600"/>
+          </a:xfrm>
+          <a:prstGeom prst="straightConnector1">
+            <a:avLst/>
+          </a:prstGeom>
+          <a:ln w="25400">
+            <a:solidFill>
+              <a:schemeClr val="accent1">
+                <a:lumMod val="40000"/>
+                <a:lumOff val="60000"/>
+              </a:schemeClr>
+            </a:solidFill>
+            <a:tailEnd type="triangle" w="lg" len="med"/>
+          </a:ln>
+        </p:spPr>
+        <p:style>
+          <a:lnRef idx="1">
+            <a:schemeClr val="accent1"/>
+          </a:lnRef>
+          <a:fillRef idx="0">
+            <a:schemeClr val="accent1"/>
+          </a:fillRef>
+          <a:effectRef idx="0">
+            <a:schemeClr val="accent1"/>
+          </a:effectRef>
+          <a:fontRef idx="minor">
+            <a:schemeClr val="tx1"/>
+          </a:fontRef>
+        </p:style>
+      </p:cxnSp>
+      <p:sp>
+        <p:nvSpPr>
+          <p:cNvPr id="56" name="TextBox 55"/>
           <p:cNvSpPr txBox="1"/>
           <p:nvPr/>
         </p:nvSpPr>
         <p:spPr>
           <a:xfrm>
-            <a:off x="5029200" y="457200"/>
-            <a:ext cx="2971800" cy="646331"/>
+            <a:off x="7736032" y="1170801"/>
+            <a:ext cx="787980" cy="276999"/>
           </a:xfrm>
           <a:prstGeom prst="rect">
             <a:avLst/>
@@ -3248,162 +3485,142 @@
           <a:noFill/>
         </p:spPr>
         <p:txBody>
-          <a:bodyPr wrap="square" rtlCol="0">
+          <a:bodyPr wrap="square" lIns="91440" tIns="45720" rIns="91440" bIns="45720" rtlCol="0">
             <a:spAutoFit/>
           </a:bodyPr>
           <a:lstStyle/>
           <a:p>
             <a:r>
-              <a:rPr lang="en-US" dirty="0" smtClean="0">
-                <a:solidFill>
-                  <a:schemeClr val="tx1">
-                    <a:lumMod val="75000"/>
-                    <a:lumOff val="25000"/>
-                  </a:schemeClr>
-                </a:solidFill>
-              </a:rPr>
-              <a:t>Provides a Web accessible interface to </a:t>
-            </a:r>
-            <a:r>
-              <a:rPr lang="en-US" dirty="0" smtClean="0">
-                <a:solidFill>
-                  <a:schemeClr val="tx1">
-                    <a:lumMod val="75000"/>
-                    <a:lumOff val="25000"/>
-                  </a:schemeClr>
-                </a:solidFill>
-              </a:rPr>
-              <a:t>VisKo capabilities</a:t>
-            </a:r>
-            <a:endParaRPr lang="en-US" dirty="0" smtClean="0">
-              <a:solidFill>
-                <a:schemeClr val="tx1">
-                  <a:lumMod val="75000"/>
-                  <a:lumOff val="25000"/>
-                </a:schemeClr>
-              </a:solidFill>
-            </a:endParaRPr>
-          </a:p>
-        </p:txBody>
-      </p:sp>
-      <p:sp>
-        <p:nvSpPr>
-          <p:cNvPr id="25" name="Rectangle 24"/>
+              <a:rPr lang="en-US" sz="1200" dirty="0"/>
+              <a:t>exposes</a:t>
+            </a:r>
+          </a:p>
+        </p:txBody>
+      </p:sp>
+      <p:sp>
+        <p:nvSpPr>
+          <p:cNvPr id="50" name="Rounded Rectangle 49"/>
           <p:cNvSpPr/>
           <p:nvPr/>
         </p:nvSpPr>
         <p:spPr>
           <a:xfrm>
-            <a:off x="5037856" y="1905000"/>
-            <a:ext cx="2963144" cy="646331"/>
-          </a:xfrm>
-          <a:prstGeom prst="rect">
+            <a:off x="3545032" y="304800"/>
+            <a:ext cx="2209800" cy="609600"/>
+          </a:xfrm>
+          <a:prstGeom prst="roundRect">
             <a:avLst/>
           </a:prstGeom>
-        </p:spPr>
-        <p:txBody>
-          <a:bodyPr wrap="square">
-            <a:spAutoFit/>
-          </a:bodyPr>
-          <a:lstStyle/>
-          <a:p>
-            <a:r>
-              <a:rPr lang="en-US" dirty="0" smtClean="0">
-                <a:solidFill>
-                  <a:schemeClr val="tx1">
-                    <a:lumMod val="75000"/>
-                    <a:lumOff val="25000"/>
-                  </a:schemeClr>
-                </a:solidFill>
-              </a:rPr>
-              <a:t>Executes visualization queries and manages VisKo RDF</a:t>
-            </a:r>
-          </a:p>
-        </p:txBody>
-      </p:sp>
-      <p:sp>
-        <p:nvSpPr>
-          <p:cNvPr id="26" name="Rectangle 25"/>
+          <a:solidFill>
+            <a:schemeClr val="accent1">
+              <a:lumMod val="60000"/>
+              <a:lumOff val="40000"/>
+            </a:schemeClr>
+          </a:solidFill>
+        </p:spPr>
+        <p:style>
+          <a:lnRef idx="2">
+            <a:schemeClr val="accent1">
+              <a:shade val="50000"/>
+            </a:schemeClr>
+          </a:lnRef>
+          <a:fillRef idx="1">
+            <a:schemeClr val="accent1"/>
+          </a:fillRef>
+          <a:effectRef idx="0">
+            <a:schemeClr val="accent1"/>
+          </a:effectRef>
+          <a:fontRef idx="minor">
+            <a:schemeClr val="lt1"/>
+          </a:fontRef>
+        </p:style>
+        <p:txBody>
+          <a:bodyPr lIns="91440" tIns="45720" rIns="91440" bIns="45720" rtlCol="0" anchor="ctr"/>
+          <a:lstStyle/>
+          <a:p>
+            <a:pPr algn="ctr"/>
+            <a:r>
+              <a:rPr lang="en-US" dirty="0" err="1" smtClean="0"/>
+              <a:t>tdb</a:t>
+            </a:r>
+            <a:endParaRPr lang="en-US" dirty="0"/>
+          </a:p>
+        </p:txBody>
+      </p:sp>
+      <p:sp>
+        <p:nvSpPr>
+          <p:cNvPr id="51" name="Rounded Rectangle 50"/>
           <p:cNvSpPr/>
           <p:nvPr/>
         </p:nvSpPr>
         <p:spPr>
           <a:xfrm>
-            <a:off x="1066800" y="4029670"/>
-            <a:ext cx="2445330" cy="923330"/>
-          </a:xfrm>
-          <a:prstGeom prst="rect">
+            <a:off x="3545032" y="1447800"/>
+            <a:ext cx="2209800" cy="609600"/>
+          </a:xfrm>
+          <a:prstGeom prst="roundRect">
             <a:avLst/>
           </a:prstGeom>
-        </p:spPr>
-        <p:txBody>
-          <a:bodyPr wrap="square">
-            <a:spAutoFit/>
-          </a:bodyPr>
-          <a:lstStyle/>
-          <a:p>
-            <a:r>
-              <a:rPr lang="en-US" dirty="0" smtClean="0">
-                <a:solidFill>
-                  <a:schemeClr val="tx1">
-                    <a:lumMod val="75000"/>
-                    <a:lumOff val="25000"/>
-                  </a:schemeClr>
-                </a:solidFill>
-              </a:rPr>
-              <a:t>Contains the VisKo ontology </a:t>
-            </a:r>
-            <a:r>
-              <a:rPr lang="en-US" dirty="0" smtClean="0">
-                <a:solidFill>
-                  <a:schemeClr val="tx1">
-                    <a:lumMod val="75000"/>
-                    <a:lumOff val="25000"/>
-                  </a:schemeClr>
-                </a:solidFill>
-              </a:rPr>
-              <a:t>and toolkit </a:t>
-            </a:r>
-            <a:r>
-              <a:rPr lang="en-US" dirty="0" smtClean="0">
-                <a:solidFill>
-                  <a:schemeClr val="tx1">
-                    <a:lumMod val="75000"/>
-                    <a:lumOff val="25000"/>
-                  </a:schemeClr>
-                </a:solidFill>
-              </a:rPr>
-              <a:t>instances</a:t>
-            </a:r>
-            <a:endParaRPr lang="en-US" dirty="0">
-              <a:solidFill>
-                <a:schemeClr val="tx1">
-                  <a:lumMod val="75000"/>
-                  <a:lumOff val="25000"/>
-                </a:schemeClr>
-              </a:solidFill>
-            </a:endParaRPr>
+          <a:solidFill>
+            <a:schemeClr val="accent1">
+              <a:lumMod val="60000"/>
+              <a:lumOff val="40000"/>
+            </a:schemeClr>
+          </a:solidFill>
+        </p:spPr>
+        <p:style>
+          <a:lnRef idx="2">
+            <a:schemeClr val="accent1">
+              <a:shade val="50000"/>
+            </a:schemeClr>
+          </a:lnRef>
+          <a:fillRef idx="1">
+            <a:schemeClr val="accent1"/>
+          </a:fillRef>
+          <a:effectRef idx="0">
+            <a:schemeClr val="accent1"/>
+          </a:effectRef>
+          <a:fontRef idx="minor">
+            <a:schemeClr val="lt1"/>
+          </a:fontRef>
+        </p:style>
+        <p:txBody>
+          <a:bodyPr lIns="91440" tIns="45720" rIns="91440" bIns="45720" rtlCol="0" anchor="ctr"/>
+          <a:lstStyle/>
+          <a:p>
+            <a:pPr algn="ctr"/>
+            <a:r>
+              <a:rPr lang="en-US" dirty="0" smtClean="0"/>
+              <a:t>resources</a:t>
+            </a:r>
+            <a:endParaRPr lang="en-US" dirty="0"/>
           </a:p>
         </p:txBody>
       </p:sp>
       <p:cxnSp>
         <p:nvCxnSpPr>
-          <p:cNvPr id="31" name="Straight Arrow Connector 30"/>
+          <p:cNvPr id="55" name="Straight Arrow Connector 54"/>
           <p:cNvCxnSpPr>
-            <a:stCxn id="19" idx="2"/>
-            <a:endCxn id="18" idx="0"/>
+            <a:stCxn id="50" idx="1"/>
+            <a:endCxn id="28" idx="3"/>
           </p:cNvCxnSpPr>
           <p:nvPr/>
         </p:nvCxnSpPr>
         <p:spPr>
-          <a:xfrm>
-            <a:off x="3771900" y="1103531"/>
-            <a:ext cx="0" cy="801469"/>
+          <a:xfrm flipH="1">
+            <a:off x="2402032" y="609600"/>
+            <a:ext cx="1143000" cy="0"/>
           </a:xfrm>
           <a:prstGeom prst="straightConnector1">
             <a:avLst/>
           </a:prstGeom>
-          <a:ln>
+          <a:ln w="25400">
+            <a:solidFill>
+              <a:schemeClr val="accent1">
+                <a:lumMod val="40000"/>
+                <a:lumOff val="60000"/>
+              </a:schemeClr>
+            </a:solidFill>
             <a:tailEnd type="triangle" w="lg" len="med"/>
           </a:ln>
         </p:spPr>
@@ -3424,22 +3641,28 @@
       </p:cxnSp>
       <p:cxnSp>
         <p:nvCxnSpPr>
-          <p:cNvPr id="34" name="Straight Arrow Connector 33"/>
+          <p:cNvPr id="59" name="Straight Arrow Connector 58"/>
           <p:cNvCxnSpPr>
-            <a:stCxn id="18" idx="2"/>
-            <a:endCxn id="20" idx="0"/>
+            <a:stCxn id="50" idx="2"/>
+            <a:endCxn id="51" idx="0"/>
           </p:cNvCxnSpPr>
           <p:nvPr/>
         </p:nvCxnSpPr>
         <p:spPr>
-          <a:xfrm flipH="1">
-            <a:off x="2238375" y="2514600"/>
-            <a:ext cx="1533525" cy="838200"/>
+          <a:xfrm>
+            <a:off x="4649932" y="914400"/>
+            <a:ext cx="0" cy="533400"/>
           </a:xfrm>
           <a:prstGeom prst="straightConnector1">
             <a:avLst/>
           </a:prstGeom>
-          <a:ln>
+          <a:ln w="25400">
+            <a:solidFill>
+              <a:schemeClr val="accent1">
+                <a:lumMod val="40000"/>
+                <a:lumOff val="60000"/>
+              </a:schemeClr>
+            </a:solidFill>
             <a:tailEnd type="triangle" w="lg" len="med"/>
           </a:ln>
         </p:spPr>
@@ -3458,151 +3681,30 @@
           </a:fontRef>
         </p:style>
       </p:cxnSp>
-      <p:sp>
-        <p:nvSpPr>
-          <p:cNvPr id="56" name="TextBox 55"/>
-          <p:cNvSpPr txBox="1"/>
-          <p:nvPr/>
-        </p:nvSpPr>
-        <p:spPr>
-          <a:xfrm>
-            <a:off x="3733800" y="1170801"/>
-            <a:ext cx="787980" cy="276999"/>
-          </a:xfrm>
-          <a:prstGeom prst="rect">
-            <a:avLst/>
-          </a:prstGeom>
-          <a:noFill/>
-        </p:spPr>
-        <p:txBody>
-          <a:bodyPr wrap="square" rtlCol="0">
-            <a:spAutoFit/>
-          </a:bodyPr>
-          <a:lstStyle/>
-          <a:p>
-            <a:r>
-              <a:rPr lang="en-US" sz="1200" dirty="0" smtClean="0"/>
-              <a:t>exposes</a:t>
-            </a:r>
-            <a:endParaRPr lang="en-US" sz="1200" dirty="0"/>
-          </a:p>
-        </p:txBody>
-      </p:sp>
-      <p:sp>
-        <p:nvSpPr>
-          <p:cNvPr id="58" name="TextBox 57"/>
-          <p:cNvSpPr txBox="1"/>
-          <p:nvPr/>
-        </p:nvSpPr>
-        <p:spPr>
-          <a:xfrm>
-            <a:off x="2869620" y="2895600"/>
-            <a:ext cx="787980" cy="276999"/>
-          </a:xfrm>
-          <a:prstGeom prst="rect">
-            <a:avLst/>
-          </a:prstGeom>
-          <a:noFill/>
-        </p:spPr>
-        <p:txBody>
-          <a:bodyPr wrap="square" rtlCol="0">
-            <a:spAutoFit/>
-          </a:bodyPr>
-          <a:lstStyle/>
-          <a:p>
-            <a:r>
-              <a:rPr lang="en-US" sz="1200" dirty="0" smtClean="0"/>
-              <a:t>manages</a:t>
-            </a:r>
-            <a:endParaRPr lang="en-US" sz="1200" dirty="0"/>
-          </a:p>
-        </p:txBody>
-      </p:sp>
-      <p:sp>
-        <p:nvSpPr>
-          <p:cNvPr id="64" name="Rounded Rectangle 63"/>
-          <p:cNvSpPr/>
-          <p:nvPr/>
-        </p:nvSpPr>
-        <p:spPr>
-          <a:xfrm>
-            <a:off x="4495800" y="3352800"/>
-            <a:ext cx="2228850" cy="609600"/>
-          </a:xfrm>
-          <a:prstGeom prst="roundRect">
-            <a:avLst/>
-          </a:prstGeom>
-          <a:solidFill>
-            <a:schemeClr val="accent1">
-              <a:lumMod val="20000"/>
-              <a:lumOff val="80000"/>
-            </a:schemeClr>
-          </a:solidFill>
-          <a:ln w="12700">
-            <a:prstDash val="lgDash"/>
-          </a:ln>
-        </p:spPr>
-        <p:style>
-          <a:lnRef idx="2">
-            <a:schemeClr val="accent1">
-              <a:shade val="50000"/>
-            </a:schemeClr>
-          </a:lnRef>
-          <a:fillRef idx="1">
-            <a:schemeClr val="accent1"/>
-          </a:fillRef>
-          <a:effectRef idx="0">
-            <a:schemeClr val="accent1"/>
-          </a:effectRef>
-          <a:fontRef idx="minor">
-            <a:schemeClr val="lt1"/>
-          </a:fontRef>
-        </p:style>
-        <p:txBody>
-          <a:bodyPr rtlCol="0" anchor="ctr"/>
-          <a:lstStyle/>
-          <a:p>
-            <a:pPr algn="ctr"/>
-            <a:r>
-              <a:rPr lang="en-US" dirty="0" err="1" smtClean="0">
-                <a:solidFill>
-                  <a:schemeClr val="tx1">
-                    <a:lumMod val="75000"/>
-                    <a:lumOff val="25000"/>
-                  </a:schemeClr>
-                </a:solidFill>
-              </a:rPr>
-              <a:t>tdb</a:t>
-            </a:r>
-            <a:endParaRPr lang="en-US" dirty="0">
-              <a:solidFill>
-                <a:schemeClr val="tx1">
-                  <a:lumMod val="75000"/>
-                  <a:lumOff val="25000"/>
-                </a:schemeClr>
-              </a:solidFill>
-            </a:endParaRPr>
-          </a:p>
-        </p:txBody>
-      </p:sp>
       <p:cxnSp>
         <p:nvCxnSpPr>
-          <p:cNvPr id="65" name="Straight Arrow Connector 64"/>
+          <p:cNvPr id="66" name="Straight Arrow Connector 65"/>
           <p:cNvCxnSpPr>
-            <a:stCxn id="18" idx="2"/>
-            <a:endCxn id="64" idx="0"/>
+            <a:stCxn id="19" idx="0"/>
+            <a:endCxn id="18" idx="2"/>
           </p:cNvCxnSpPr>
           <p:nvPr/>
         </p:nvCxnSpPr>
         <p:spPr>
-          <a:xfrm>
-            <a:off x="3771900" y="2514600"/>
-            <a:ext cx="1838325" cy="838200"/>
+          <a:xfrm flipV="1">
+            <a:off x="7697932" y="914400"/>
+            <a:ext cx="0" cy="533400"/>
           </a:xfrm>
           <a:prstGeom prst="straightConnector1">
             <a:avLst/>
           </a:prstGeom>
-          <a:ln>
+          <a:ln w="25400">
+            <a:solidFill>
+              <a:schemeClr val="accent1">
+                <a:lumMod val="40000"/>
+                <a:lumOff val="60000"/>
+              </a:schemeClr>
+            </a:solidFill>
             <a:tailEnd type="triangle" w="lg" len="med"/>
           </a:ln>
         </p:spPr>
@@ -3621,187 +3723,30 @@
           </a:fontRef>
         </p:style>
       </p:cxnSp>
-      <p:sp>
-        <p:nvSpPr>
-          <p:cNvPr id="68" name="TextBox 67"/>
-          <p:cNvSpPr txBox="1"/>
-          <p:nvPr/>
-        </p:nvSpPr>
-        <p:spPr>
-          <a:xfrm>
-            <a:off x="4114800" y="2895600"/>
-            <a:ext cx="787980" cy="276999"/>
-          </a:xfrm>
-          <a:prstGeom prst="rect">
-            <a:avLst/>
-          </a:prstGeom>
-          <a:noFill/>
-        </p:spPr>
-        <p:txBody>
-          <a:bodyPr wrap="square" rtlCol="0">
-            <a:spAutoFit/>
-          </a:bodyPr>
-          <a:lstStyle/>
-          <a:p>
-            <a:r>
-              <a:rPr lang="en-US" sz="1200" dirty="0" smtClean="0"/>
-              <a:t>queries</a:t>
-            </a:r>
-            <a:endParaRPr lang="en-US" sz="1200" dirty="0"/>
-          </a:p>
-        </p:txBody>
-      </p:sp>
-      <p:sp>
-        <p:nvSpPr>
-          <p:cNvPr id="69" name="Rectangle 68"/>
-          <p:cNvSpPr/>
-          <p:nvPr/>
-        </p:nvSpPr>
-        <p:spPr>
-          <a:xfrm>
-            <a:off x="4572000" y="4029670"/>
-            <a:ext cx="2445330" cy="923330"/>
-          </a:xfrm>
-          <a:prstGeom prst="rect">
-            <a:avLst/>
-          </a:prstGeom>
-        </p:spPr>
-        <p:txBody>
-          <a:bodyPr wrap="square">
-            <a:spAutoFit/>
-          </a:bodyPr>
-          <a:lstStyle/>
-          <a:p>
-            <a:r>
-              <a:rPr lang="en-US" dirty="0" smtClean="0">
-                <a:solidFill>
-                  <a:schemeClr val="tx1">
-                    <a:lumMod val="75000"/>
-                    <a:lumOff val="25000"/>
-                  </a:schemeClr>
-                </a:solidFill>
-              </a:rPr>
-              <a:t>C</a:t>
-            </a:r>
-            <a:r>
-              <a:rPr lang="en-US" dirty="0" smtClean="0">
-                <a:solidFill>
-                  <a:schemeClr val="tx1">
-                    <a:lumMod val="75000"/>
-                    <a:lumOff val="25000"/>
-                  </a:schemeClr>
-                </a:solidFill>
-              </a:rPr>
-              <a:t>onsolidates toolkit instances </a:t>
-            </a:r>
-            <a:r>
-              <a:rPr lang="en-US" dirty="0" smtClean="0">
-                <a:solidFill>
-                  <a:schemeClr val="tx1">
-                    <a:lumMod val="75000"/>
-                    <a:lumOff val="25000"/>
-                  </a:schemeClr>
-                </a:solidFill>
-              </a:rPr>
-              <a:t>into </a:t>
-            </a:r>
-            <a:r>
-              <a:rPr lang="en-US" dirty="0">
-                <a:solidFill>
-                  <a:schemeClr val="tx1">
-                    <a:lumMod val="75000"/>
-                    <a:lumOff val="25000"/>
-                  </a:schemeClr>
-                </a:solidFill>
-              </a:rPr>
-              <a:t> </a:t>
-            </a:r>
-            <a:r>
-              <a:rPr lang="en-US" dirty="0" smtClean="0">
-                <a:solidFill>
-                  <a:schemeClr val="tx1">
-                    <a:lumMod val="75000"/>
-                    <a:lumOff val="25000"/>
-                  </a:schemeClr>
-                </a:solidFill>
-              </a:rPr>
-              <a:t>TDB </a:t>
-            </a:r>
-          </a:p>
-          <a:p>
-            <a:r>
-              <a:rPr lang="en-US" dirty="0" smtClean="0">
-                <a:solidFill>
-                  <a:schemeClr val="tx1">
-                    <a:lumMod val="75000"/>
-                    <a:lumOff val="25000"/>
-                  </a:schemeClr>
-                </a:solidFill>
-              </a:rPr>
-              <a:t>(not </a:t>
-            </a:r>
-            <a:r>
-              <a:rPr lang="en-US" dirty="0" smtClean="0">
-                <a:solidFill>
-                  <a:schemeClr val="tx1">
-                    <a:lumMod val="75000"/>
-                    <a:lumOff val="25000"/>
-                  </a:schemeClr>
-                </a:solidFill>
-              </a:rPr>
-              <a:t>persisted on </a:t>
-            </a:r>
-            <a:r>
-              <a:rPr lang="en-US" dirty="0" err="1" smtClean="0">
-                <a:solidFill>
-                  <a:schemeClr val="tx1">
-                    <a:lumMod val="75000"/>
-                    <a:lumOff val="25000"/>
-                  </a:schemeClr>
-                </a:solidFill>
-              </a:rPr>
-              <a:t>git</a:t>
-            </a:r>
-            <a:r>
-              <a:rPr lang="en-US" dirty="0" smtClean="0">
-                <a:solidFill>
-                  <a:schemeClr val="tx1">
-                    <a:lumMod val="75000"/>
-                    <a:lumOff val="25000"/>
-                  </a:schemeClr>
-                </a:solidFill>
-              </a:rPr>
-              <a:t>)</a:t>
-            </a:r>
-            <a:endParaRPr lang="en-US" dirty="0">
-              <a:solidFill>
-                <a:schemeClr val="tx1">
-                  <a:lumMod val="75000"/>
-                  <a:lumOff val="25000"/>
-                </a:schemeClr>
-              </a:solidFill>
-            </a:endParaRPr>
-          </a:p>
-        </p:txBody>
-      </p:sp>
       <p:cxnSp>
         <p:nvCxnSpPr>
-          <p:cNvPr id="70" name="Straight Arrow Connector 69"/>
+          <p:cNvPr id="72" name="Straight Arrow Connector 71"/>
           <p:cNvCxnSpPr>
-            <a:stCxn id="64" idx="1"/>
-            <a:endCxn id="20" idx="3"/>
+            <a:stCxn id="18" idx="1"/>
+            <a:endCxn id="50" idx="3"/>
           </p:cNvCxnSpPr>
           <p:nvPr/>
         </p:nvCxnSpPr>
         <p:spPr>
           <a:xfrm flipH="1">
-            <a:off x="3352800" y="3657600"/>
-            <a:ext cx="1143000" cy="0"/>
+            <a:off x="5754832" y="609600"/>
+            <a:ext cx="838200" cy="0"/>
           </a:xfrm>
           <a:prstGeom prst="straightConnector1">
             <a:avLst/>
           </a:prstGeom>
-          <a:ln>
+          <a:ln w="25400">
+            <a:solidFill>
+              <a:schemeClr val="accent1">
+                <a:lumMod val="40000"/>
+                <a:lumOff val="60000"/>
+              </a:schemeClr>
+            </a:solidFill>
             <a:tailEnd type="triangle" w="lg" len="med"/>
           </a:ln>
         </p:spPr>
@@ -3828,8 +3773,8 @@
         </p:nvSpPr>
         <p:spPr>
           <a:xfrm>
-            <a:off x="3479220" y="3657600"/>
-            <a:ext cx="1092780" cy="276999"/>
+            <a:off x="2402032" y="332601"/>
+            <a:ext cx="988868" cy="276999"/>
           </a:xfrm>
           <a:prstGeom prst="rect">
             <a:avLst/>
@@ -3837,18 +3782,312 @@
           <a:noFill/>
         </p:spPr>
         <p:txBody>
-          <a:bodyPr wrap="square" rtlCol="0">
+          <a:bodyPr wrap="square" lIns="91440" tIns="45720" rIns="91440" bIns="45720" rtlCol="0">
             <a:spAutoFit/>
           </a:bodyPr>
           <a:lstStyle/>
           <a:p>
             <a:r>
+              <a:rPr lang="en-US" sz="1200" dirty="0" smtClean="0"/>
+              <a:t>derived from</a:t>
+            </a:r>
+            <a:endParaRPr lang="en-US" sz="1200" dirty="0"/>
+          </a:p>
+        </p:txBody>
+      </p:sp>
+      <p:sp>
+        <p:nvSpPr>
+          <p:cNvPr id="82" name="TextBox 81"/>
+          <p:cNvSpPr txBox="1"/>
+          <p:nvPr/>
+        </p:nvSpPr>
+        <p:spPr>
+          <a:xfrm>
+            <a:off x="3621232" y="914400"/>
+            <a:ext cx="1092780" cy="276999"/>
+          </a:xfrm>
+          <a:prstGeom prst="rect">
+            <a:avLst/>
+          </a:prstGeom>
+          <a:noFill/>
+        </p:spPr>
+        <p:txBody>
+          <a:bodyPr wrap="square" lIns="91440" tIns="45720" rIns="91440" bIns="45720" rtlCol="0">
+            <a:spAutoFit/>
+          </a:bodyPr>
+          <a:lstStyle/>
+          <a:p>
+            <a:r>
               <a:rPr lang="en-US" sz="1200" dirty="0"/>
-              <a:t>d</a:t>
+              <a:t>derived from</a:t>
+            </a:r>
+          </a:p>
+        </p:txBody>
+      </p:sp>
+      <p:sp>
+        <p:nvSpPr>
+          <p:cNvPr id="68" name="TextBox 67"/>
+          <p:cNvSpPr txBox="1"/>
+          <p:nvPr/>
+        </p:nvSpPr>
+        <p:spPr>
+          <a:xfrm>
+            <a:off x="5881252" y="637401"/>
+            <a:ext cx="787980" cy="276999"/>
+          </a:xfrm>
+          <a:prstGeom prst="rect">
+            <a:avLst/>
+          </a:prstGeom>
+          <a:noFill/>
+        </p:spPr>
+        <p:txBody>
+          <a:bodyPr wrap="square" lIns="91440" tIns="45720" rIns="91440" bIns="45720" rtlCol="0">
+            <a:spAutoFit/>
+          </a:bodyPr>
+          <a:lstStyle/>
+          <a:p>
+            <a:r>
+              <a:rPr lang="en-US" sz="1200" dirty="0"/>
+              <a:t>queries</a:t>
+            </a:r>
+          </a:p>
+        </p:txBody>
+      </p:sp>
+      <p:pic>
+        <p:nvPicPr>
+          <p:cNvPr id="1026" name="Picture 2" descr="C:\Program Files (x86)\Microsoft Office\MEDIA\CAGCAT10\j0195384.wmf"/>
+          <p:cNvPicPr>
+            <a:picLocks noChangeAspect="1" noChangeArrowheads="1"/>
+          </p:cNvPicPr>
+          <p:nvPr/>
+        </p:nvPicPr>
+        <p:blipFill>
+          <a:blip r:embed="rId2" cstate="print">
+            <a:extLst>
+              <a:ext uri="{28A0092B-C50C-407E-A947-70E740481C1C}">
+                <a14:useLocalDpi xmlns:a14="http://schemas.microsoft.com/office/drawing/2010/main" val="0"/>
+              </a:ext>
+            </a:extLst>
+          </a:blip>
+          <a:srcRect/>
+          <a:stretch>
+            <a:fillRect/>
+          </a:stretch>
+        </p:blipFill>
+        <p:spPr bwMode="auto">
+          <a:xfrm>
+            <a:off x="7249066" y="2740819"/>
+            <a:ext cx="897731" cy="916781"/>
+          </a:xfrm>
+          <a:prstGeom prst="rect">
+            <a:avLst/>
+          </a:prstGeom>
+          <a:noFill/>
+          <a:extLst>
+            <a:ext uri="{909E8E84-426E-40DD-AFC4-6F175D3DCCD1}">
+              <a14:hiddenFill xmlns:a14="http://schemas.microsoft.com/office/drawing/2010/main">
+                <a:solidFill>
+                  <a:srgbClr val="FFFFFF"/>
+                </a:solidFill>
+              </a14:hiddenFill>
+            </a:ext>
+          </a:extLst>
+        </p:spPr>
+      </p:pic>
+      <p:cxnSp>
+        <p:nvCxnSpPr>
+          <p:cNvPr id="22" name="Straight Arrow Connector 21"/>
+          <p:cNvCxnSpPr>
+            <a:stCxn id="1026" idx="0"/>
+            <a:endCxn id="19" idx="2"/>
+          </p:cNvCxnSpPr>
+          <p:nvPr/>
+        </p:nvCxnSpPr>
+        <p:spPr>
+          <a:xfrm flipV="1">
+            <a:off x="7697932" y="2057400"/>
+            <a:ext cx="0" cy="683419"/>
+          </a:xfrm>
+          <a:prstGeom prst="straightConnector1">
+            <a:avLst/>
+          </a:prstGeom>
+          <a:ln w="25400">
+            <a:solidFill>
+              <a:schemeClr val="accent1">
+                <a:lumMod val="40000"/>
+                <a:lumOff val="60000"/>
+              </a:schemeClr>
+            </a:solidFill>
+            <a:tailEnd type="triangle" w="lg" len="med"/>
+          </a:ln>
+        </p:spPr>
+        <p:style>
+          <a:lnRef idx="1">
+            <a:schemeClr val="accent1"/>
+          </a:lnRef>
+          <a:fillRef idx="0">
+            <a:schemeClr val="accent1"/>
+          </a:fillRef>
+          <a:effectRef idx="0">
+            <a:schemeClr val="accent1"/>
+          </a:effectRef>
+          <a:fontRef idx="minor">
+            <a:schemeClr val="tx1"/>
+          </a:fontRef>
+        </p:style>
+      </p:cxnSp>
+      <p:sp>
+        <p:nvSpPr>
+          <p:cNvPr id="25" name="TextBox 24"/>
+          <p:cNvSpPr txBox="1"/>
+          <p:nvPr/>
+        </p:nvSpPr>
+        <p:spPr>
+          <a:xfrm>
+            <a:off x="6705600" y="2286000"/>
+            <a:ext cx="1023501" cy="461665"/>
+          </a:xfrm>
+          <a:prstGeom prst="rect">
+            <a:avLst/>
+          </a:prstGeom>
+          <a:noFill/>
+        </p:spPr>
+        <p:txBody>
+          <a:bodyPr wrap="square" lIns="91440" tIns="45720" rIns="91440" bIns="45720" rtlCol="0">
+            <a:spAutoFit/>
+          </a:bodyPr>
+          <a:lstStyle/>
+          <a:p>
+            <a:r>
+              <a:rPr lang="en-US" sz="1200" dirty="0"/>
+              <a:t>r</a:t>
             </a:r>
             <a:r>
               <a:rPr lang="en-US" sz="1200" dirty="0" smtClean="0"/>
-              <a:t>erived from</a:t>
+              <a:t>equests visualizations</a:t>
+            </a:r>
+            <a:endParaRPr lang="en-US" sz="1200" dirty="0"/>
+          </a:p>
+        </p:txBody>
+      </p:sp>
+      <p:pic>
+        <p:nvPicPr>
+          <p:cNvPr id="26" name="Picture 2" descr="C:\Program Files (x86)\Microsoft Office\MEDIA\CAGCAT10\j0195384.wmf"/>
+          <p:cNvPicPr>
+            <a:picLocks noChangeAspect="1" noChangeArrowheads="1"/>
+          </p:cNvPicPr>
+          <p:nvPr/>
+        </p:nvPicPr>
+        <p:blipFill>
+          <a:blip r:embed="rId2" cstate="print">
+            <a:extLst>
+              <a:ext uri="{28A0092B-C50C-407E-A947-70E740481C1C}">
+                <a14:useLocalDpi xmlns:a14="http://schemas.microsoft.com/office/drawing/2010/main" val="0"/>
+              </a:ext>
+            </a:extLst>
+          </a:blip>
+          <a:srcRect/>
+          <a:stretch>
+            <a:fillRect/>
+          </a:stretch>
+        </p:blipFill>
+        <p:spPr bwMode="auto">
+          <a:xfrm>
+            <a:off x="854869" y="2588419"/>
+            <a:ext cx="897731" cy="916781"/>
+          </a:xfrm>
+          <a:prstGeom prst="rect">
+            <a:avLst/>
+          </a:prstGeom>
+          <a:noFill/>
+          <a:scene3d>
+            <a:camera prst="orthographicFront">
+              <a:rot lat="0" lon="10799999" rev="0"/>
+            </a:camera>
+            <a:lightRig rig="threePt" dir="t"/>
+          </a:scene3d>
+          <a:extLst>
+            <a:ext uri="{909E8E84-426E-40DD-AFC4-6F175D3DCCD1}">
+              <a14:hiddenFill xmlns:a14="http://schemas.microsoft.com/office/drawing/2010/main">
+                <a:solidFill>
+                  <a:srgbClr val="FFFFFF"/>
+                </a:solidFill>
+              </a14:hiddenFill>
+            </a:ext>
+          </a:extLst>
+        </p:spPr>
+      </p:pic>
+      <p:cxnSp>
+        <p:nvCxnSpPr>
+          <p:cNvPr id="30" name="Straight Arrow Connector 29"/>
+          <p:cNvCxnSpPr>
+            <a:stCxn id="26" idx="0"/>
+            <a:endCxn id="27" idx="2"/>
+          </p:cNvCxnSpPr>
+          <p:nvPr/>
+        </p:nvCxnSpPr>
+        <p:spPr>
+          <a:xfrm flipH="1" flipV="1">
+            <a:off x="1297132" y="2133600"/>
+            <a:ext cx="6603" cy="454819"/>
+          </a:xfrm>
+          <a:prstGeom prst="straightConnector1">
+            <a:avLst/>
+          </a:prstGeom>
+          <a:ln w="25400">
+            <a:solidFill>
+              <a:schemeClr val="accent1">
+                <a:lumMod val="40000"/>
+                <a:lumOff val="60000"/>
+              </a:schemeClr>
+            </a:solidFill>
+            <a:tailEnd type="triangle" w="lg" len="med"/>
+          </a:ln>
+        </p:spPr>
+        <p:style>
+          <a:lnRef idx="1">
+            <a:schemeClr val="accent1"/>
+          </a:lnRef>
+          <a:fillRef idx="0">
+            <a:schemeClr val="accent1"/>
+          </a:fillRef>
+          <a:effectRef idx="0">
+            <a:schemeClr val="accent1"/>
+          </a:effectRef>
+          <a:fontRef idx="minor">
+            <a:schemeClr val="tx1"/>
+          </a:fontRef>
+        </p:style>
+      </p:cxnSp>
+      <p:sp>
+        <p:nvSpPr>
+          <p:cNvPr id="32" name="TextBox 31"/>
+          <p:cNvSpPr txBox="1"/>
+          <p:nvPr/>
+        </p:nvSpPr>
+        <p:spPr>
+          <a:xfrm>
+            <a:off x="1295400" y="2133600"/>
+            <a:ext cx="1023501" cy="461665"/>
+          </a:xfrm>
+          <a:prstGeom prst="rect">
+            <a:avLst/>
+          </a:prstGeom>
+          <a:noFill/>
+        </p:spPr>
+        <p:txBody>
+          <a:bodyPr wrap="square" lIns="91440" tIns="45720" rIns="91440" bIns="45720" rtlCol="0">
+            <a:spAutoFit/>
+          </a:bodyPr>
+          <a:lstStyle/>
+          <a:p>
+            <a:r>
+              <a:rPr lang="en-US" sz="1200" dirty="0"/>
+              <a:t>c</a:t>
+            </a:r>
+            <a:r>
+              <a:rPr lang="en-US" sz="1200" dirty="0" smtClean="0"/>
+              <a:t>ontributes knowledge</a:t>
             </a:r>
             <a:endParaRPr lang="en-US" sz="1200" dirty="0"/>
           </a:p>

</xml_diff>